<commit_message>
some final revisions from the Wi2020
</commit_message>
<xml_diff>
--- a/Wi20_content/SEDS/L10.Software_Design.pptx
+++ b/Wi20_content/SEDS/L10.Software_Design.pptx
@@ -272,7 +272,7 @@
               <a:pPr>
                 <a:defRPr/>
               </a:pPr>
-              <a:t>2/11/20</a:t>
+              <a:t>2/13/20</a:t>
             </a:fld>
             <a:endParaRPr lang="en-US" altLang="x-none"/>
           </a:p>
@@ -465,7 +465,7 @@
               <a:pPr>
                 <a:defRPr/>
               </a:pPr>
-              <a:t>2/11/20</a:t>
+              <a:t>2/13/20</a:t>
             </a:fld>
             <a:endParaRPr lang="en-US" altLang="x-none"/>
           </a:p>
@@ -821,7 +821,7 @@
               </a14:hiddenFill>
             </a:ext>
             <a:ext uri="{FAA26D3D-D897-4be2-8F04-BA451C77F1D7}">
-              <ma14:placeholderFlag xmlns:ma14="http://schemas.microsoft.com/office/mac/drawingml/2011/main" xmlns="" val="1"/>
+              <ma14:placeholderFlag xmlns="" xmlns:ma14="http://schemas.microsoft.com/office/mac/drawingml/2011/main" val="1"/>
             </a:ext>
           </a:extLst>
         </p:spPr>
@@ -1108,7 +1108,7 @@
               </a14:hiddenFill>
             </a:ext>
             <a:ext uri="{FAA26D3D-D897-4be2-8F04-BA451C77F1D7}">
-              <ma14:placeholderFlag xmlns:ma14="http://schemas.microsoft.com/office/mac/drawingml/2011/main" xmlns="" val="1"/>
+              <ma14:placeholderFlag xmlns="" xmlns:ma14="http://schemas.microsoft.com/office/mac/drawingml/2011/main" val="1"/>
             </a:ext>
           </a:extLst>
         </p:spPr>

</xml_diff>